<commit_message>
Added pdf, fixed last slides, wrote readme
</commit_message>
<xml_diff>
--- a/MentOS - Implementazione Scheduling Algorithms.pptx
+++ b/MentOS - Implementazione Scheduling Algorithms.pptx
@@ -148,6 +148,7 @@
     <p1510:client id="{54E84A9F-CD8C-4E3F-A663-B9CEEAA4E392}" v="23" dt="2023-08-22T18:13:14.706"/>
     <p1510:client id="{7ED6C132-1E4D-4E9F-930D-8F032D84F7BF}" v="3" dt="2023-08-23T16:21:32.476"/>
     <p1510:client id="{8DE3C47F-1934-457E-A8B6-5E42E4E33CE7}" v="5230" dt="2023-08-27T20:17:01.568"/>
+    <p1510:client id="{ECD0DF55-46F4-41D7-B04A-F7473FBBF905}" v="10" dt="2023-08-28T18:04:18.987"/>
     <p1510:client id="{F9FB13FC-ADCE-448C-8F67-2F4D113C6EAC}" v="173" dt="2023-08-21T19:49:01.525"/>
   </p1510:revLst>
 </p1510:revInfo>
@@ -3441,7 +3442,7 @@
           </a:lstStyle>
           <a:p>
             <a:fld id="{F36B8049-E9E1-4155-BDBB-289E4CF46440}" type="datetimeFigureOut">
-              <a:t>27/08/2023</a:t>
+              <a:t>28/08/2023</a:t>
             </a:fld>
             <a:endParaRPr lang="it-IT"/>
           </a:p>
@@ -3856,7 +3857,7 @@
           <a:p>
             <a:fld id="{1317C824-2132-4BB7-8F95-0CAE4412AE81}" type="slidenum">
               <a:rPr lang="it-IT" noProof="0" smtClean="0"/>
-              <a:t>17</a:t>
+              <a:t>23</a:t>
             </a:fld>
             <a:endParaRPr lang="it-IT" noProof="0"/>
           </a:p>
@@ -4006,7 +4007,7 @@
           <a:p>
             <a:fld id="{F64A8E5F-40E5-4553-9F3C-699F1A5B8145}" type="datetimeFigureOut">
               <a:rPr lang="de-DE" smtClean="0"/>
-              <a:t>27.08.2023</a:t>
+              <a:t>28.08.2023</a:t>
             </a:fld>
             <a:endParaRPr lang="de-DE"/>
           </a:p>
@@ -4176,7 +4177,7 @@
           <a:p>
             <a:fld id="{F64A8E5F-40E5-4553-9F3C-699F1A5B8145}" type="datetimeFigureOut">
               <a:rPr lang="de-DE" smtClean="0"/>
-              <a:t>27.08.2023</a:t>
+              <a:t>28.08.2023</a:t>
             </a:fld>
             <a:endParaRPr lang="de-DE"/>
           </a:p>
@@ -4356,7 +4357,7 @@
           <a:p>
             <a:fld id="{F64A8E5F-40E5-4553-9F3C-699F1A5B8145}" type="datetimeFigureOut">
               <a:rPr lang="de-DE" smtClean="0"/>
-              <a:t>27.08.2023</a:t>
+              <a:t>28.08.2023</a:t>
             </a:fld>
             <a:endParaRPr lang="de-DE"/>
           </a:p>
@@ -4661,7 +4662,7 @@
             <a:fld id="{B61BEF0D-F0BB-DE4B-95CE-6DB70DBA9567}" type="datetimeFigureOut">
               <a:rPr lang="en-US" dirty="0"/>
               <a:pPr/>
-              <a:t>8/27/2023</a:t>
+              <a:t>8/28/2023</a:t>
             </a:fld>
             <a:endParaRPr lang="en-US"/>
           </a:p>
@@ -4912,7 +4913,7 @@
             <a:fld id="{B61BEF0D-F0BB-DE4B-95CE-6DB70DBA9567}" type="datetimeFigureOut">
               <a:rPr lang="en-US" dirty="0"/>
               <a:pPr/>
-              <a:t>8/27/2023</a:t>
+              <a:t>8/28/2023</a:t>
             </a:fld>
             <a:endParaRPr lang="en-US"/>
           </a:p>
@@ -5220,7 +5221,7 @@
             <a:fld id="{B61BEF0D-F0BB-DE4B-95CE-6DB70DBA9567}" type="datetimeFigureOut">
               <a:rPr lang="en-US" dirty="0"/>
               <a:pPr/>
-              <a:t>8/27/2023</a:t>
+              <a:t>8/28/2023</a:t>
             </a:fld>
             <a:endParaRPr lang="en-US"/>
           </a:p>
@@ -5521,7 +5522,7 @@
             <a:fld id="{B61BEF0D-F0BB-DE4B-95CE-6DB70DBA9567}" type="datetimeFigureOut">
               <a:rPr lang="en-US" dirty="0"/>
               <a:pPr/>
-              <a:t>8/27/2023</a:t>
+              <a:t>8/28/2023</a:t>
             </a:fld>
             <a:endParaRPr lang="en-US"/>
           </a:p>
@@ -5942,7 +5943,7 @@
             <a:fld id="{B61BEF0D-F0BB-DE4B-95CE-6DB70DBA9567}" type="datetimeFigureOut">
               <a:rPr lang="en-US" dirty="0"/>
               <a:pPr/>
-              <a:t>8/27/2023</a:t>
+              <a:t>8/28/2023</a:t>
             </a:fld>
             <a:endParaRPr lang="en-US"/>
           </a:p>
@@ -6105,7 +6106,7 @@
             <a:fld id="{B61BEF0D-F0BB-DE4B-95CE-6DB70DBA9567}" type="datetimeFigureOut">
               <a:rPr lang="en-US" dirty="0"/>
               <a:pPr/>
-              <a:t>8/27/2023</a:t>
+              <a:t>8/28/2023</a:t>
             </a:fld>
             <a:endParaRPr lang="en-US"/>
           </a:p>
@@ -6202,7 +6203,7 @@
             <a:fld id="{B61BEF0D-F0BB-DE4B-95CE-6DB70DBA9567}" type="datetimeFigureOut">
               <a:rPr lang="en-US" dirty="0"/>
               <a:pPr/>
-              <a:t>8/27/2023</a:t>
+              <a:t>8/28/2023</a:t>
             </a:fld>
             <a:endParaRPr lang="en-US"/>
           </a:p>
@@ -6580,7 +6581,7 @@
             <a:fld id="{B61BEF0D-F0BB-DE4B-95CE-6DB70DBA9567}" type="datetimeFigureOut">
               <a:rPr lang="en-US" dirty="0"/>
               <a:pPr/>
-              <a:t>8/27/2023</a:t>
+              <a:t>8/28/2023</a:t>
             </a:fld>
             <a:endParaRPr lang="en-US"/>
           </a:p>
@@ -6773,7 +6774,7 @@
           <a:p>
             <a:fld id="{F64A8E5F-40E5-4553-9F3C-699F1A5B8145}" type="datetimeFigureOut">
               <a:rPr lang="de-DE" smtClean="0"/>
-              <a:t>27.08.2023</a:t>
+              <a:t>28.08.2023</a:t>
             </a:fld>
             <a:endParaRPr lang="de-DE"/>
           </a:p>
@@ -7036,7 +7037,7 @@
             <a:fld id="{B61BEF0D-F0BB-DE4B-95CE-6DB70DBA9567}" type="datetimeFigureOut">
               <a:rPr lang="en-US" dirty="0"/>
               <a:pPr/>
-              <a:t>8/27/2023</a:t>
+              <a:t>8/28/2023</a:t>
             </a:fld>
             <a:endParaRPr lang="en-US"/>
           </a:p>
@@ -7266,7 +7267,7 @@
             <a:fld id="{B61BEF0D-F0BB-DE4B-95CE-6DB70DBA9567}" type="datetimeFigureOut">
               <a:rPr lang="en-US" dirty="0"/>
               <a:pPr/>
-              <a:t>8/27/2023</a:t>
+              <a:t>8/28/2023</a:t>
             </a:fld>
             <a:endParaRPr lang="en-US"/>
           </a:p>
@@ -7501,7 +7502,7 @@
             <a:fld id="{B61BEF0D-F0BB-DE4B-95CE-6DB70DBA9567}" type="datetimeFigureOut">
               <a:rPr lang="en-US" dirty="0"/>
               <a:pPr/>
-              <a:t>8/27/2023</a:t>
+              <a:t>8/28/2023</a:t>
             </a:fld>
             <a:endParaRPr lang="en-US"/>
           </a:p>
@@ -7769,7 +7770,7 @@
           <a:p>
             <a:fld id="{F64A8E5F-40E5-4553-9F3C-699F1A5B8145}" type="datetimeFigureOut">
               <a:rPr lang="de-DE" smtClean="0"/>
-              <a:t>27.08.2023</a:t>
+              <a:t>28.08.2023</a:t>
             </a:fld>
             <a:endParaRPr lang="de-DE"/>
           </a:p>
@@ -8001,7 +8002,7 @@
           <a:p>
             <a:fld id="{F64A8E5F-40E5-4553-9F3C-699F1A5B8145}" type="datetimeFigureOut">
               <a:rPr lang="de-DE" smtClean="0"/>
-              <a:t>27.08.2023</a:t>
+              <a:t>28.08.2023</a:t>
             </a:fld>
             <a:endParaRPr lang="de-DE"/>
           </a:p>
@@ -8368,7 +8369,7 @@
           <a:p>
             <a:fld id="{F64A8E5F-40E5-4553-9F3C-699F1A5B8145}" type="datetimeFigureOut">
               <a:rPr lang="de-DE" smtClean="0"/>
-              <a:t>27.08.2023</a:t>
+              <a:t>28.08.2023</a:t>
             </a:fld>
             <a:endParaRPr lang="de-DE"/>
           </a:p>
@@ -8486,7 +8487,7 @@
           <a:p>
             <a:fld id="{F64A8E5F-40E5-4553-9F3C-699F1A5B8145}" type="datetimeFigureOut">
               <a:rPr lang="de-DE" smtClean="0"/>
-              <a:t>27.08.2023</a:t>
+              <a:t>28.08.2023</a:t>
             </a:fld>
             <a:endParaRPr lang="de-DE"/>
           </a:p>
@@ -8581,7 +8582,7 @@
           <a:p>
             <a:fld id="{F64A8E5F-40E5-4553-9F3C-699F1A5B8145}" type="datetimeFigureOut">
               <a:rPr lang="de-DE" smtClean="0"/>
-              <a:t>27.08.2023</a:t>
+              <a:t>28.08.2023</a:t>
             </a:fld>
             <a:endParaRPr lang="de-DE"/>
           </a:p>
@@ -8858,7 +8859,7 @@
           <a:p>
             <a:fld id="{F64A8E5F-40E5-4553-9F3C-699F1A5B8145}" type="datetimeFigureOut">
               <a:rPr lang="de-DE" smtClean="0"/>
-              <a:t>27.08.2023</a:t>
+              <a:t>28.08.2023</a:t>
             </a:fld>
             <a:endParaRPr lang="de-DE"/>
           </a:p>
@@ -9111,7 +9112,7 @@
           <a:p>
             <a:fld id="{F64A8E5F-40E5-4553-9F3C-699F1A5B8145}" type="datetimeFigureOut">
               <a:rPr lang="de-DE" smtClean="0"/>
-              <a:t>27.08.2023</a:t>
+              <a:t>28.08.2023</a:t>
             </a:fld>
             <a:endParaRPr lang="de-DE"/>
           </a:p>
@@ -9324,7 +9325,7 @@
           <a:p>
             <a:fld id="{F64A8E5F-40E5-4553-9F3C-699F1A5B8145}" type="datetimeFigureOut">
               <a:rPr lang="de-DE" smtClean="0"/>
-              <a:t>27.08.2023</a:t>
+              <a:t>28.08.2023</a:t>
             </a:fld>
             <a:endParaRPr lang="de-DE"/>
           </a:p>
@@ -9889,7 +9890,7 @@
             <a:fld id="{B61BEF0D-F0BB-DE4B-95CE-6DB70DBA9567}" type="datetimeFigureOut">
               <a:rPr lang="en-US" dirty="0"/>
               <a:pPr/>
-              <a:t>8/27/2023</a:t>
+              <a:t>8/28/2023</a:t>
             </a:fld>
             <a:endParaRPr lang="en-US"/>
           </a:p>
@@ -12836,7 +12837,7 @@
             </a:r>
             <a:r>
               <a:rPr lang="it-IT" sz="2200" dirty="0"/>
-              <a:t>. il task attuale può essere interrotto per dare priorità ad un altro)</a:t>
+              <a:t>. la task attuale può essere interrotta per dare priorità ad un'altra)</a:t>
             </a:r>
           </a:p>
           <a:p>
@@ -13633,13 +13634,13 @@
             <a:pPr marL="305435" indent="-305435"/>
             <a:r>
               <a:rPr lang="it-IT" sz="2400" dirty="0"/>
-              <a:t>Questo algoritmo funziona allo stesso modo dell' EDF ma non effettua l'analisi di </a:t>
-            </a:r>
-            <a:r>
-              <a:rPr lang="it-IT" sz="2400" err="1"/>
+              <a:t>Questo algoritmo funziona allo stesso modo dell' EDF, ma non effettua l'analisi di </a:t>
+            </a:r>
+            <a:r>
+              <a:rPr lang="it-IT" sz="2400" dirty="0" err="1"/>
               <a:t>schedulabilità</a:t>
             </a:r>
-            <a:endParaRPr lang="it-IT" sz="2400"/>
+            <a:endParaRPr lang="it-IT" sz="2400" dirty="0"/>
           </a:p>
           <a:p>
             <a:pPr marL="305435" indent="-305435"/>
@@ -16155,7 +16156,7 @@
               <a:t>In </a:t>
             </a:r>
             <a:r>
-              <a:rPr lang="it-IT" sz="2400" err="1"/>
+              <a:rPr lang="it-IT" sz="2400" dirty="0" err="1"/>
               <a:t>MentOS</a:t>
             </a:r>
             <a:r>
@@ -16163,8 +16164,8 @@
               <a:t> il compito di effettuare quest'analisi è della funzione </a:t>
             </a:r>
             <a:r>
-              <a:rPr lang="it-IT" sz="2400" i="1" err="1"/>
-              <a:t>sys_waiperiod</a:t>
+              <a:rPr lang="it-IT" sz="2400" i="1" dirty="0" err="1"/>
+              <a:t>sys_waitperiod</a:t>
             </a:r>
             <a:r>
               <a:rPr lang="it-IT" sz="2400" i="1" dirty="0"/>
@@ -16175,7 +16176,7 @@
               <a:t>(in </a:t>
             </a:r>
             <a:r>
-              <a:rPr lang="it-IT" sz="2400" i="1" err="1"/>
+              <a:rPr lang="it-IT" sz="2400" i="1" dirty="0" err="1"/>
               <a:t>lib</a:t>
             </a:r>
             <a:r>
@@ -16183,7 +16184,7 @@
               <a:t>/</a:t>
             </a:r>
             <a:r>
-              <a:rPr lang="it-IT" sz="2400" i="1" err="1"/>
+              <a:rPr lang="it-IT" sz="2400" i="1" dirty="0" err="1"/>
               <a:t>process</a:t>
             </a:r>
             <a:r>
@@ -16191,7 +16192,7 @@
               <a:t>/</a:t>
             </a:r>
             <a:r>
-              <a:rPr lang="it-IT" sz="2400" i="1" err="1"/>
+              <a:rPr lang="it-IT" sz="2400" i="1" dirty="0" err="1"/>
               <a:t>scheduler.h</a:t>
             </a:r>
             <a:r>
@@ -16199,7 +16200,7 @@
               <a:t>) che analizza la task in questione eseguendola la prima volta come se non fosse periodica e calcolandone il tempo massimo di esecuzione possibile (</a:t>
             </a:r>
             <a:r>
-              <a:rPr lang="it-IT" sz="2400" err="1"/>
+              <a:rPr lang="it-IT" sz="2400" dirty="0" err="1"/>
               <a:t>Worst</a:t>
             </a:r>
             <a:r>
@@ -16207,7 +16208,7 @@
               <a:t> Case </a:t>
             </a:r>
             <a:r>
-              <a:rPr lang="it-IT" sz="2400" err="1"/>
+              <a:rPr lang="it-IT" sz="2400" dirty="0" err="1"/>
               <a:t>Execution</a:t>
             </a:r>
             <a:r>

</xml_diff>